<commit_message>
Changes in structure in Scale-Up section    Abhinav to mirror changes in Scale-Out section
git-svn-id: file://localhost/tmp/svn2git/svn@3342 defb5e50-622e-49ec-a68e-d72c7db87b45
</commit_message>
<xml_diff>
--- a/papers/async-re/data/RE_ahm10.pptx
+++ b/papers/async-re/data/RE_ahm10.pptx
@@ -493,11 +493,11 @@
           </c:val>
         </c:ser>
         <c:marker val="1"/>
-        <c:axId val="491440424"/>
-        <c:axId val="573202296"/>
+        <c:axId val="418648232"/>
+        <c:axId val="433960936"/>
       </c:lineChart>
       <c:catAx>
-        <c:axId val="491440424"/>
+        <c:axId val="418648232"/>
         <c:scaling>
           <c:orientation val="minMax"/>
         </c:scaling>
@@ -532,14 +532,14 @@
             <a:endParaRPr lang="en-US"/>
           </a:p>
         </c:txPr>
-        <c:crossAx val="573202296"/>
+        <c:crossAx val="433960936"/>
         <c:crosses val="autoZero"/>
         <c:auto val="1"/>
         <c:lblAlgn val="ctr"/>
         <c:lblOffset val="100"/>
       </c:catAx>
       <c:valAx>
-        <c:axId val="573202296"/>
+        <c:axId val="433960936"/>
         <c:scaling>
           <c:orientation val="minMax"/>
           <c:min val="400.0"/>
@@ -576,7 +576,7 @@
             <a:endParaRPr lang="en-US"/>
           </a:p>
         </c:txPr>
-        <c:crossAx val="491440424"/>
+        <c:crossAx val="418648232"/>
         <c:crosses val="autoZero"/>
         <c:crossBetween val="between"/>
         <c:majorUnit val="100.0"/>
@@ -965,11 +965,11 @@
             </c:numRef>
           </c:val>
         </c:ser>
-        <c:axId val="572966504"/>
-        <c:axId val="543295672"/>
+        <c:axId val="506501016"/>
+        <c:axId val="825155992"/>
       </c:barChart>
       <c:catAx>
-        <c:axId val="572966504"/>
+        <c:axId val="506501016"/>
         <c:scaling>
           <c:orientation val="minMax"/>
         </c:scaling>
@@ -1103,14 +1103,14 @@
           <c:layout/>
         </c:title>
         <c:tickLblPos val="nextTo"/>
-        <c:crossAx val="543295672"/>
+        <c:crossAx val="825155992"/>
         <c:crosses val="autoZero"/>
         <c:auto val="1"/>
         <c:lblAlgn val="ctr"/>
         <c:lblOffset val="100"/>
       </c:catAx>
       <c:valAx>
-        <c:axId val="543295672"/>
+        <c:axId val="825155992"/>
         <c:scaling>
           <c:orientation val="minMax"/>
         </c:scaling>
@@ -1136,7 +1136,7 @@
         </c:title>
         <c:numFmt formatCode="General" sourceLinked="1"/>
         <c:tickLblPos val="nextTo"/>
-        <c:crossAx val="572966504"/>
+        <c:crossAx val="506501016"/>
         <c:crosses val="autoZero"/>
         <c:crossBetween val="between"/>
       </c:valAx>
@@ -1244,7 +1244,7 @@
             <a:fld id="{9A6AC4B2-6F12-454D-8DA7-7B9C78843B81}" type="datetimeFigureOut">
               <a:rPr lang="en-US" smtClean="0"/>
               <a:pPr/>
-              <a:t>9/15/10</a:t>
+              <a:t>9/21/10</a:t>
             </a:fld>
             <a:endParaRPr lang="en-US"/>
           </a:p>
@@ -1407,7 +1407,7 @@
             <a:fld id="{19F24AD4-A78B-B645-8B43-825B1EB2901C}" type="datetimeFigureOut">
               <a:rPr lang="en-US" smtClean="0"/>
               <a:pPr/>
-              <a:t>9/15/10</a:t>
+              <a:t>9/21/10</a:t>
             </a:fld>
             <a:endParaRPr lang="en-US"/>
           </a:p>
@@ -2911,7 +2911,7 @@
             <a:fld id="{4C4AD4EB-88D0-C141-9474-CCD86A78CB94}" type="datetimeFigureOut">
               <a:rPr lang="en-US" smtClean="0"/>
               <a:pPr/>
-              <a:t>9/15/10</a:t>
+              <a:t>9/21/10</a:t>
             </a:fld>
             <a:endParaRPr lang="en-US" dirty="0"/>
           </a:p>
@@ -3250,7 +3250,7 @@
             <a:fld id="{F19CAA94-9393-BB4A-8CB6-008B1351A132}" type="datetime1">
               <a:rPr lang="en-US" smtClean="0"/>
               <a:pPr/>
-              <a:t>9/15/10</a:t>
+              <a:t>9/21/10</a:t>
             </a:fld>
             <a:endParaRPr lang="en-US"/>
           </a:p>
@@ -3573,7 +3573,7 @@
             <a:fld id="{459EC1CE-E98D-704D-AD6F-6E3323A36483}" type="datetime1">
               <a:rPr lang="en-US" smtClean="0"/>
               <a:pPr/>
-              <a:t>9/15/10</a:t>
+              <a:t>9/21/10</a:t>
             </a:fld>
             <a:endParaRPr lang="en-US"/>
           </a:p>
@@ -3849,7 +3849,7 @@
             <a:fld id="{23E692A5-8B3E-1949-B0CC-6F0593ACFA8E}" type="datetime1">
               <a:rPr lang="en-US" smtClean="0"/>
               <a:pPr/>
-              <a:t>9/15/10</a:t>
+              <a:t>9/21/10</a:t>
             </a:fld>
             <a:endParaRPr lang="en-US"/>
           </a:p>
@@ -4141,7 +4141,7 @@
             <a:fld id="{C381DA14-A3C0-9C42-96F2-BEE3D5DE963D}" type="datetime1">
               <a:rPr lang="en-US" smtClean="0"/>
               <a:pPr/>
-              <a:t>9/15/10</a:t>
+              <a:t>9/21/10</a:t>
             </a:fld>
             <a:endParaRPr lang="en-US"/>
           </a:p>
@@ -4468,7 +4468,7 @@
             <a:fld id="{33319320-9A5F-694B-B7B5-C734EC93AAA2}" type="datetime1">
               <a:rPr lang="en-US" smtClean="0"/>
               <a:pPr/>
-              <a:t>9/15/10</a:t>
+              <a:t>9/21/10</a:t>
             </a:fld>
             <a:endParaRPr lang="en-US"/>
           </a:p>
@@ -4716,7 +4716,7 @@
             <a:fld id="{CF6CE397-A6E6-7547-B24A-92BB5049E0F2}" type="datetime1">
               <a:rPr lang="en-US" smtClean="0"/>
               <a:pPr/>
-              <a:t>9/15/10</a:t>
+              <a:t>9/21/10</a:t>
             </a:fld>
             <a:endParaRPr lang="en-US"/>
           </a:p>
@@ -4893,7 +4893,7 @@
             <a:fld id="{27AB7D46-BD5E-E641-9118-DCE28F3B83FA}" type="datetime1">
               <a:rPr lang="en-US" smtClean="0"/>
               <a:pPr/>
-              <a:t>9/15/10</a:t>
+              <a:t>9/21/10</a:t>
             </a:fld>
             <a:endParaRPr lang="en-US"/>
           </a:p>
@@ -5008,7 +5008,7 @@
             <a:fld id="{4C4AD4EB-88D0-C141-9474-CCD86A78CB94}" type="datetimeFigureOut">
               <a:rPr lang="en-US" smtClean="0"/>
               <a:pPr/>
-              <a:t>9/15/10</a:t>
+              <a:t>9/21/10</a:t>
             </a:fld>
             <a:endParaRPr lang="en-US"/>
           </a:p>
@@ -5291,7 +5291,7 @@
             <a:fld id="{4C4AD4EB-88D0-C141-9474-CCD86A78CB94}" type="datetimeFigureOut">
               <a:rPr lang="en-US" smtClean="0"/>
               <a:pPr/>
-              <a:t>9/15/10</a:t>
+              <a:t>9/21/10</a:t>
             </a:fld>
             <a:endParaRPr lang="en-US" dirty="0"/>
           </a:p>
@@ -5506,7 +5506,7 @@
             <a:fld id="{4C4AD4EB-88D0-C141-9474-CCD86A78CB94}" type="datetimeFigureOut">
               <a:rPr lang="en-US" smtClean="0"/>
               <a:pPr/>
-              <a:t>9/15/10</a:t>
+              <a:t>9/21/10</a:t>
             </a:fld>
             <a:endParaRPr lang="en-US"/>
           </a:p>
@@ -5782,7 +5782,7 @@
             <a:fld id="{ADB8239A-D789-5443-937F-338E3AE3D41C}" type="datetime1">
               <a:rPr lang="en-US" smtClean="0"/>
               <a:pPr/>
-              <a:t>9/15/10</a:t>
+              <a:t>9/21/10</a:t>
             </a:fld>
             <a:endParaRPr lang="en-US"/>
           </a:p>
@@ -5855,7 +5855,7 @@
             <a:fld id="{4C4AD4EB-88D0-C141-9474-CCD86A78CB94}" type="datetimeFigureOut">
               <a:rPr lang="en-US" smtClean="0"/>
               <a:pPr/>
-              <a:t>9/15/10</a:t>
+              <a:t>9/21/10</a:t>
             </a:fld>
             <a:endParaRPr lang="en-US"/>
           </a:p>
@@ -6108,7 +6108,7 @@
             <a:fld id="{BC26097E-015C-3B4D-86C1-CD2AD30F0B81}" type="datetime1">
               <a:rPr lang="en-US" smtClean="0"/>
               <a:pPr/>
-              <a:t>9/15/10</a:t>
+              <a:t>9/21/10</a:t>
             </a:fld>
             <a:endParaRPr lang="en-US"/>
           </a:p>
@@ -6384,7 +6384,7 @@
             <a:fld id="{ED6649F4-2545-3040-B7BD-803CA59D50C7}" type="datetime1">
               <a:rPr lang="en-US" smtClean="0"/>
               <a:pPr/>
-              <a:t>9/15/10</a:t>
+              <a:t>9/21/10</a:t>
             </a:fld>
             <a:endParaRPr lang="en-US"/>
           </a:p>
@@ -6692,7 +6692,7 @@
             <a:fld id="{833A9088-CEDD-2F48-A9A0-611A3CC03FE9}" type="datetime1">
               <a:rPr lang="en-US" smtClean="0"/>
               <a:pPr/>
-              <a:t>9/15/10</a:t>
+              <a:t>9/21/10</a:t>
             </a:fld>
             <a:endParaRPr lang="en-US"/>
           </a:p>
@@ -6986,7 +6986,7 @@
             <a:fld id="{AED87ACF-EB3C-EA42-8610-542FB50388EB}" type="datetime1">
               <a:rPr lang="en-US" smtClean="0"/>
               <a:pPr/>
-              <a:t>9/15/10</a:t>
+              <a:t>9/21/10</a:t>
             </a:fld>
             <a:endParaRPr lang="en-US"/>
           </a:p>
@@ -7418,7 +7418,7 @@
             <a:fld id="{0E0DC31B-692F-774E-A937-DA560DE61DA8}" type="datetime1">
               <a:rPr lang="en-US" smtClean="0"/>
               <a:pPr/>
-              <a:t>9/15/10</a:t>
+              <a:t>9/21/10</a:t>
             </a:fld>
             <a:endParaRPr lang="en-US"/>
           </a:p>
@@ -7766,7 +7766,7 @@
             <a:fld id="{95DEFDAE-5BDC-1B4F-BC4C-23C867CEBC21}" type="datetime1">
               <a:rPr lang="en-US" smtClean="0"/>
               <a:pPr/>
-              <a:t>9/15/10</a:t>
+              <a:t>9/21/10</a:t>
             </a:fld>
             <a:endParaRPr lang="en-US"/>
           </a:p>
@@ -7858,7 +7858,7 @@
             <a:fld id="{9F53C516-787B-9A45-AFCF-5D75DD78DEBE}" type="datetime1">
               <a:rPr lang="en-US" smtClean="0"/>
               <a:pPr/>
-              <a:t>9/15/10</a:t>
+              <a:t>9/21/10</a:t>
             </a:fld>
             <a:endParaRPr lang="en-US"/>
           </a:p>
@@ -8072,7 +8072,7 @@
             <a:fld id="{A3476A5E-2ED6-7749-A8C1-D0B1EEEB97E0}" type="datetime1">
               <a:rPr lang="en-US" smtClean="0"/>
               <a:pPr/>
-              <a:t>9/15/10</a:t>
+              <a:t>9/21/10</a:t>
             </a:fld>
             <a:endParaRPr lang="en-US"/>
           </a:p>
@@ -8723,7 +8723,7 @@
             <a:fld id="{4C4AD4EB-88D0-C141-9474-CCD86A78CB94}" type="datetimeFigureOut">
               <a:rPr lang="en-US" smtClean="0"/>
               <a:pPr/>
-              <a:t>9/15/10</a:t>
+              <a:t>9/21/10</a:t>
             </a:fld>
             <a:endParaRPr lang="en-US"/>
           </a:p>

</xml_diff>